<commit_message>
Pre lecture on Linear regression
</commit_message>
<xml_diff>
--- a/Model selection.pptx
+++ b/Model selection.pptx
@@ -253,7 +253,7 @@
           <a:p>
             <a:fld id="{8F741A61-F0C9-4925-957E-8E5C327261BC}" type="datetimeFigureOut">
               <a:rPr lang="en-US" smtClean="0"/>
-              <a:t>5/16/2020</a:t>
+              <a:t>5/18/2020</a:t>
             </a:fld>
             <a:endParaRPr lang="en-US"/>
           </a:p>
@@ -571,11 +571,7 @@
             </a:r>
             <a:r>
               <a:rPr lang="it-IT" baseline="0" dirty="0" smtClean="0"/>
-              <a:t> it has only one estimator. We’ll see later the parameter tuning (grid search</a:t>
-            </a:r>
-            <a:r>
-              <a:rPr lang="it-IT" baseline="0" dirty="0" smtClean="0"/>
-              <a:t>)</a:t>
+              <a:t> it has only one estimator. We’ll see later the parameter tuning (grid search)</a:t>
             </a:r>
           </a:p>
           <a:p>
@@ -1060,23 +1056,11 @@
           <a:p>
             <a:r>
               <a:rPr lang="it-IT" dirty="0" smtClean="0"/>
-              <a:t>As, before, </a:t>
-            </a:r>
-            <a:r>
-              <a:rPr lang="it-IT" dirty="0" smtClean="0"/>
-              <a:t>we are dealing with only</a:t>
+              <a:t>As, before, we are dealing with only</a:t>
             </a:r>
             <a:r>
               <a:rPr lang="it-IT" baseline="0" dirty="0" smtClean="0"/>
-              <a:t> </a:t>
-            </a:r>
-            <a:r>
-              <a:rPr lang="it-IT" baseline="0" dirty="0" smtClean="0"/>
-              <a:t>one estimator, not parameter tuning (grid search</a:t>
-            </a:r>
-            <a:r>
-              <a:rPr lang="it-IT" baseline="0" dirty="0" smtClean="0"/>
-              <a:t>)</a:t>
+              <a:t> one estimator, not parameter tuning (grid search)</a:t>
             </a:r>
           </a:p>
           <a:p>
@@ -1897,7 +1881,7 @@
           <a:p>
             <a:fld id="{63A1C593-65D0-4073-BCC9-577B9352EA97}" type="datetimeFigureOut">
               <a:rPr lang="en-US" smtClean="0"/>
-              <a:t>5/16/2020</a:t>
+              <a:t>5/18/2020</a:t>
             </a:fld>
             <a:endParaRPr lang="en-US"/>
           </a:p>
@@ -2067,7 +2051,7 @@
           <a:p>
             <a:fld id="{63A1C593-65D0-4073-BCC9-577B9352EA97}" type="datetimeFigureOut">
               <a:rPr lang="en-US" smtClean="0"/>
-              <a:t>5/16/2020</a:t>
+              <a:t>5/18/2020</a:t>
             </a:fld>
             <a:endParaRPr lang="en-US"/>
           </a:p>
@@ -2247,7 +2231,7 @@
           <a:p>
             <a:fld id="{63A1C593-65D0-4073-BCC9-577B9352EA97}" type="datetimeFigureOut">
               <a:rPr lang="en-US" smtClean="0"/>
-              <a:t>5/16/2020</a:t>
+              <a:t>5/18/2020</a:t>
             </a:fld>
             <a:endParaRPr lang="en-US"/>
           </a:p>
@@ -2417,7 +2401,7 @@
           <a:p>
             <a:fld id="{63A1C593-65D0-4073-BCC9-577B9352EA97}" type="datetimeFigureOut">
               <a:rPr lang="en-US" smtClean="0"/>
-              <a:t>5/16/2020</a:t>
+              <a:t>5/18/2020</a:t>
             </a:fld>
             <a:endParaRPr lang="en-US"/>
           </a:p>
@@ -2663,7 +2647,7 @@
           <a:p>
             <a:fld id="{63A1C593-65D0-4073-BCC9-577B9352EA97}" type="datetimeFigureOut">
               <a:rPr lang="en-US" smtClean="0"/>
-              <a:t>5/16/2020</a:t>
+              <a:t>5/18/2020</a:t>
             </a:fld>
             <a:endParaRPr lang="en-US"/>
           </a:p>
@@ -2895,7 +2879,7 @@
           <a:p>
             <a:fld id="{63A1C593-65D0-4073-BCC9-577B9352EA97}" type="datetimeFigureOut">
               <a:rPr lang="en-US" smtClean="0"/>
-              <a:t>5/16/2020</a:t>
+              <a:t>5/18/2020</a:t>
             </a:fld>
             <a:endParaRPr lang="en-US"/>
           </a:p>
@@ -3262,7 +3246,7 @@
           <a:p>
             <a:fld id="{63A1C593-65D0-4073-BCC9-577B9352EA97}" type="datetimeFigureOut">
               <a:rPr lang="en-US" smtClean="0"/>
-              <a:t>5/16/2020</a:t>
+              <a:t>5/18/2020</a:t>
             </a:fld>
             <a:endParaRPr lang="en-US"/>
           </a:p>
@@ -3380,7 +3364,7 @@
           <a:p>
             <a:fld id="{63A1C593-65D0-4073-BCC9-577B9352EA97}" type="datetimeFigureOut">
               <a:rPr lang="en-US" smtClean="0"/>
-              <a:t>5/16/2020</a:t>
+              <a:t>5/18/2020</a:t>
             </a:fld>
             <a:endParaRPr lang="en-US"/>
           </a:p>
@@ -3475,7 +3459,7 @@
           <a:p>
             <a:fld id="{63A1C593-65D0-4073-BCC9-577B9352EA97}" type="datetimeFigureOut">
               <a:rPr lang="en-US" smtClean="0"/>
-              <a:t>5/16/2020</a:t>
+              <a:t>5/18/2020</a:t>
             </a:fld>
             <a:endParaRPr lang="en-US"/>
           </a:p>
@@ -3752,7 +3736,7 @@
           <a:p>
             <a:fld id="{63A1C593-65D0-4073-BCC9-577B9352EA97}" type="datetimeFigureOut">
               <a:rPr lang="en-US" smtClean="0"/>
-              <a:t>5/16/2020</a:t>
+              <a:t>5/18/2020</a:t>
             </a:fld>
             <a:endParaRPr lang="en-US"/>
           </a:p>
@@ -4005,7 +3989,7 @@
           <a:p>
             <a:fld id="{63A1C593-65D0-4073-BCC9-577B9352EA97}" type="datetimeFigureOut">
               <a:rPr lang="en-US" smtClean="0"/>
-              <a:t>5/16/2020</a:t>
+              <a:t>5/18/2020</a:t>
             </a:fld>
             <a:endParaRPr lang="en-US"/>
           </a:p>
@@ -4218,7 +4202,7 @@
           <a:p>
             <a:fld id="{63A1C593-65D0-4073-BCC9-577B9352EA97}" type="datetimeFigureOut">
               <a:rPr lang="en-US" smtClean="0"/>
-              <a:t>5/16/2020</a:t>
+              <a:t>5/18/2020</a:t>
             </a:fld>
             <a:endParaRPr lang="en-US"/>
           </a:p>
@@ -5323,7 +5307,6 @@
               <a:rPr lang="en-US" sz="1800" dirty="0"/>
               <a:t>just divides the dataset into k folds</a:t>
             </a:r>
-            <a:endParaRPr lang="en-US" sz="1800" dirty="0"/>
           </a:p>
         </p:txBody>
       </p:sp>
@@ -7844,11 +7827,7 @@
             </a:r>
             <a:r>
               <a:rPr lang="en-US" dirty="0"/>
-              <a:t> computation budget </a:t>
-            </a:r>
-            <a:r>
-              <a:rPr lang="en-US" dirty="0"/>
-              <a:t>can be chosen independent of the number of parameters and possible values</a:t>
+              <a:t> computation budget can be chosen independent of the number of parameters and possible values</a:t>
             </a:r>
             <a:r>
               <a:rPr lang="en-US" dirty="0" smtClean="0"/>
@@ -7869,7 +7848,6 @@
               <a:rPr lang="en-US" dirty="0"/>
               <a:t>being the number of sampled candidates or sampling iterations</a:t>
             </a:r>
-            <a:endParaRPr lang="en-US" dirty="0"/>
           </a:p>
           <a:p>
             <a:pPr lvl="1"/>
@@ -10905,11 +10883,7 @@
             <a:pPr lvl="1"/>
             <a:r>
               <a:rPr lang="en-US" dirty="0" smtClean="0"/>
-              <a:t>S</a:t>
-            </a:r>
-            <a:r>
-              <a:rPr lang="en-US" dirty="0" smtClean="0"/>
-              <a:t>ee next page</a:t>
+              <a:t>See next page</a:t>
             </a:r>
             <a:endParaRPr lang="en-US" dirty="0"/>
           </a:p>
@@ -11288,13 +11262,6 @@
               </a:rPr>
               <a:t> has label j and value 0 otherwise.</a:t>
             </a:r>
-            <a:endParaRPr lang="en-US" dirty="0">
-              <a:solidFill>
-                <a:schemeClr val="bg1">
-                  <a:lumMod val="75000"/>
-                </a:schemeClr>
-              </a:solidFill>
-            </a:endParaRPr>
           </a:p>
         </p:txBody>
       </p:sp>

</xml_diff>

<commit_message>
Pre lezione pipeline anno 1
</commit_message>
<xml_diff>
--- a/Model selection.pptx
+++ b/Model selection.pptx
@@ -253,7 +253,7 @@
           <a:p>
             <a:fld id="{8F741A61-F0C9-4925-957E-8E5C327261BC}" type="datetimeFigureOut">
               <a:rPr lang="en-US" smtClean="0"/>
-              <a:t>5/28/2020</a:t>
+              <a:t>6/3/2020</a:t>
             </a:fld>
             <a:endParaRPr lang="en-US"/>
           </a:p>
@@ -1659,15 +1659,7 @@
           <a:p>
             <a:r>
               <a:rPr lang="it-IT" dirty="0" smtClean="0"/>
-              <a:t>Num </a:t>
-            </a:r>
-            <a:r>
-              <a:rPr lang="it-IT" dirty="0" smtClean="0"/>
-              <a:t>is the number of </a:t>
-            </a:r>
-            <a:r>
-              <a:rPr lang="it-IT" dirty="0" smtClean="0"/>
-              <a:t>samples</a:t>
+              <a:t>Num is the number of samples</a:t>
             </a:r>
             <a:endParaRPr lang="en-US" dirty="0"/>
           </a:p>
@@ -2016,7 +2008,7 @@
           <a:p>
             <a:fld id="{63A1C593-65D0-4073-BCC9-577B9352EA97}" type="datetimeFigureOut">
               <a:rPr lang="en-US" smtClean="0"/>
-              <a:t>5/28/2020</a:t>
+              <a:t>6/3/2020</a:t>
             </a:fld>
             <a:endParaRPr lang="en-US"/>
           </a:p>
@@ -2186,7 +2178,7 @@
           <a:p>
             <a:fld id="{63A1C593-65D0-4073-BCC9-577B9352EA97}" type="datetimeFigureOut">
               <a:rPr lang="en-US" smtClean="0"/>
-              <a:t>5/28/2020</a:t>
+              <a:t>6/3/2020</a:t>
             </a:fld>
             <a:endParaRPr lang="en-US"/>
           </a:p>
@@ -2366,7 +2358,7 @@
           <a:p>
             <a:fld id="{63A1C593-65D0-4073-BCC9-577B9352EA97}" type="datetimeFigureOut">
               <a:rPr lang="en-US" smtClean="0"/>
-              <a:t>5/28/2020</a:t>
+              <a:t>6/3/2020</a:t>
             </a:fld>
             <a:endParaRPr lang="en-US"/>
           </a:p>
@@ -2536,7 +2528,7 @@
           <a:p>
             <a:fld id="{63A1C593-65D0-4073-BCC9-577B9352EA97}" type="datetimeFigureOut">
               <a:rPr lang="en-US" smtClean="0"/>
-              <a:t>5/28/2020</a:t>
+              <a:t>6/3/2020</a:t>
             </a:fld>
             <a:endParaRPr lang="en-US"/>
           </a:p>
@@ -2782,7 +2774,7 @@
           <a:p>
             <a:fld id="{63A1C593-65D0-4073-BCC9-577B9352EA97}" type="datetimeFigureOut">
               <a:rPr lang="en-US" smtClean="0"/>
-              <a:t>5/28/2020</a:t>
+              <a:t>6/3/2020</a:t>
             </a:fld>
             <a:endParaRPr lang="en-US"/>
           </a:p>
@@ -3014,7 +3006,7 @@
           <a:p>
             <a:fld id="{63A1C593-65D0-4073-BCC9-577B9352EA97}" type="datetimeFigureOut">
               <a:rPr lang="en-US" smtClean="0"/>
-              <a:t>5/28/2020</a:t>
+              <a:t>6/3/2020</a:t>
             </a:fld>
             <a:endParaRPr lang="en-US"/>
           </a:p>
@@ -3381,7 +3373,7 @@
           <a:p>
             <a:fld id="{63A1C593-65D0-4073-BCC9-577B9352EA97}" type="datetimeFigureOut">
               <a:rPr lang="en-US" smtClean="0"/>
-              <a:t>5/28/2020</a:t>
+              <a:t>6/3/2020</a:t>
             </a:fld>
             <a:endParaRPr lang="en-US"/>
           </a:p>
@@ -3499,7 +3491,7 @@
           <a:p>
             <a:fld id="{63A1C593-65D0-4073-BCC9-577B9352EA97}" type="datetimeFigureOut">
               <a:rPr lang="en-US" smtClean="0"/>
-              <a:t>5/28/2020</a:t>
+              <a:t>6/3/2020</a:t>
             </a:fld>
             <a:endParaRPr lang="en-US"/>
           </a:p>
@@ -3594,7 +3586,7 @@
           <a:p>
             <a:fld id="{63A1C593-65D0-4073-BCC9-577B9352EA97}" type="datetimeFigureOut">
               <a:rPr lang="en-US" smtClean="0"/>
-              <a:t>5/28/2020</a:t>
+              <a:t>6/3/2020</a:t>
             </a:fld>
             <a:endParaRPr lang="en-US"/>
           </a:p>
@@ -3871,7 +3863,7 @@
           <a:p>
             <a:fld id="{63A1C593-65D0-4073-BCC9-577B9352EA97}" type="datetimeFigureOut">
               <a:rPr lang="en-US" smtClean="0"/>
-              <a:t>5/28/2020</a:t>
+              <a:t>6/3/2020</a:t>
             </a:fld>
             <a:endParaRPr lang="en-US"/>
           </a:p>
@@ -4124,7 +4116,7 @@
           <a:p>
             <a:fld id="{63A1C593-65D0-4073-BCC9-577B9352EA97}" type="datetimeFigureOut">
               <a:rPr lang="en-US" smtClean="0"/>
-              <a:t>5/28/2020</a:t>
+              <a:t>6/3/2020</a:t>
             </a:fld>
             <a:endParaRPr lang="en-US"/>
           </a:p>
@@ -4337,7 +4329,7 @@
           <a:p>
             <a:fld id="{63A1C593-65D0-4073-BCC9-577B9352EA97}" type="datetimeFigureOut">
               <a:rPr lang="en-US" smtClean="0"/>
-              <a:t>5/28/2020</a:t>
+              <a:t>6/3/2020</a:t>
             </a:fld>
             <a:endParaRPr lang="en-US"/>
           </a:p>
@@ -12500,13 +12492,8 @@
           <a:p>
             <a:r>
               <a:rPr lang="it-IT" dirty="0" smtClean="0"/>
-              <a:t>Check difference with </a:t>
-            </a:r>
-            <a:r>
-              <a:rPr lang="it-IT" dirty="0" smtClean="0"/>
-              <a:t>R2 (coefficient of determination)</a:t>
-            </a:r>
-            <a:endParaRPr lang="it-IT" dirty="0" smtClean="0"/>
+              <a:t>Check difference with R2 (coefficient of determination)</a:t>
+            </a:r>
           </a:p>
           <a:p>
             <a:r>
@@ -12547,16 +12534,16 @@
               <a:t>) / </a:t>
             </a:r>
             <a:r>
-              <a:rPr lang="en-US" dirty="0" err="1"/>
-              <a:t>Variance</a:t>
-            </a:r>
-            <a:r>
-              <a:rPr lang="en-US" baseline="-25000" dirty="0" err="1"/>
+              <a:rPr lang="en-US" dirty="0" smtClean="0"/>
+              <a:t>Variance(</a:t>
+            </a:r>
+            <a:r>
+              <a:rPr lang="en-US" dirty="0" err="1" smtClean="0"/>
               <a:t>y_actual</a:t>
             </a:r>
             <a:r>
-              <a:rPr lang="en-US" dirty="0"/>
-              <a:t>]</a:t>
+              <a:rPr lang="en-US" dirty="0" smtClean="0"/>
+              <a:t>)]</a:t>
             </a:r>
             <a:endParaRPr lang="it-IT" dirty="0"/>
           </a:p>

</xml_diff>